<commit_message>
update queue slide, make clearer *3/2 example
</commit_message>
<xml_diff>
--- a/05-deque-radix/06-queue.pptx
+++ b/05-deque-radix/06-queue.pptx
@@ -222,7 +222,7 @@
           <a:p>
             <a:fld id="{B8232ADB-21AB-864C-AA5F-62FAC9F9D2E2}" type="datetimeFigureOut">
               <a:rPr lang="en-TH" smtClean="0"/>
-              <a:t>08/28/2024</a:t>
+              <a:t>08/26/2025</a:t>
             </a:fld>
             <a:endParaRPr lang="en-TH"/>
           </a:p>
@@ -621,7 +621,7 @@
           <a:p>
             <a:fld id="{8CD50AF8-5E19-40BC-9427-ED8232607B09}" type="datetimeFigureOut">
               <a:rPr lang="th-TH" smtClean="0"/>
-              <a:t>28/08/67</a:t>
+              <a:t>26/08/68</a:t>
             </a:fld>
             <a:endParaRPr lang="th-TH"/>
           </a:p>
@@ -791,7 +791,7 @@
           <a:p>
             <a:fld id="{8CD50AF8-5E19-40BC-9427-ED8232607B09}" type="datetimeFigureOut">
               <a:rPr lang="th-TH" smtClean="0"/>
-              <a:t>28/08/67</a:t>
+              <a:t>26/08/68</a:t>
             </a:fld>
             <a:endParaRPr lang="th-TH"/>
           </a:p>
@@ -971,7 +971,7 @@
           <a:p>
             <a:fld id="{8CD50AF8-5E19-40BC-9427-ED8232607B09}" type="datetimeFigureOut">
               <a:rPr lang="th-TH" smtClean="0"/>
-              <a:t>28/08/67</a:t>
+              <a:t>26/08/68</a:t>
             </a:fld>
             <a:endParaRPr lang="th-TH"/>
           </a:p>
@@ -1507,7 +1507,7 @@
           <a:p>
             <a:fld id="{8CD50AF8-5E19-40BC-9427-ED8232607B09}" type="datetimeFigureOut">
               <a:rPr lang="th-TH" smtClean="0"/>
-              <a:t>28/08/67</a:t>
+              <a:t>26/08/68</a:t>
             </a:fld>
             <a:endParaRPr lang="th-TH"/>
           </a:p>
@@ -1755,7 +1755,7 @@
           <a:p>
             <a:fld id="{8CD50AF8-5E19-40BC-9427-ED8232607B09}" type="datetimeFigureOut">
               <a:rPr lang="th-TH" smtClean="0"/>
-              <a:t>28/08/67</a:t>
+              <a:t>26/08/68</a:t>
             </a:fld>
             <a:endParaRPr lang="th-TH"/>
           </a:p>
@@ -1987,7 +1987,7 @@
           <a:p>
             <a:fld id="{8CD50AF8-5E19-40BC-9427-ED8232607B09}" type="datetimeFigureOut">
               <a:rPr lang="th-TH" smtClean="0"/>
-              <a:t>28/08/67</a:t>
+              <a:t>26/08/68</a:t>
             </a:fld>
             <a:endParaRPr lang="th-TH"/>
           </a:p>
@@ -2354,7 +2354,7 @@
           <a:p>
             <a:fld id="{8CD50AF8-5E19-40BC-9427-ED8232607B09}" type="datetimeFigureOut">
               <a:rPr lang="th-TH" smtClean="0"/>
-              <a:t>28/08/67</a:t>
+              <a:t>26/08/68</a:t>
             </a:fld>
             <a:endParaRPr lang="th-TH"/>
           </a:p>
@@ -2472,7 +2472,7 @@
           <a:p>
             <a:fld id="{8CD50AF8-5E19-40BC-9427-ED8232607B09}" type="datetimeFigureOut">
               <a:rPr lang="th-TH" smtClean="0"/>
-              <a:t>28/08/67</a:t>
+              <a:t>26/08/68</a:t>
             </a:fld>
             <a:endParaRPr lang="th-TH"/>
           </a:p>
@@ -2567,7 +2567,7 @@
           <a:p>
             <a:fld id="{8CD50AF8-5E19-40BC-9427-ED8232607B09}" type="datetimeFigureOut">
               <a:rPr lang="th-TH" smtClean="0"/>
-              <a:t>28/08/67</a:t>
+              <a:t>26/08/68</a:t>
             </a:fld>
             <a:endParaRPr lang="th-TH"/>
           </a:p>
@@ -2844,7 +2844,7 @@
           <a:p>
             <a:fld id="{8CD50AF8-5E19-40BC-9427-ED8232607B09}" type="datetimeFigureOut">
               <a:rPr lang="th-TH" smtClean="0"/>
-              <a:t>28/08/67</a:t>
+              <a:t>26/08/68</a:t>
             </a:fld>
             <a:endParaRPr lang="th-TH"/>
           </a:p>
@@ -3101,7 +3101,7 @@
           <a:p>
             <a:fld id="{8CD50AF8-5E19-40BC-9427-ED8232607B09}" type="datetimeFigureOut">
               <a:rPr lang="th-TH" smtClean="0"/>
-              <a:t>28/08/67</a:t>
+              <a:t>26/08/68</a:t>
             </a:fld>
             <a:endParaRPr lang="th-TH"/>
           </a:p>
@@ -3317,7 +3317,7 @@
           <a:p>
             <a:fld id="{8CD50AF8-5E19-40BC-9427-ED8232607B09}" type="datetimeFigureOut">
               <a:rPr lang="th-TH" smtClean="0"/>
-              <a:t>28/08/67</a:t>
+              <a:t>26/08/68</a:t>
             </a:fld>
             <a:endParaRPr lang="th-TH"/>
           </a:p>
@@ -16618,8 +16618,8 @@
         </p:nvSpPr>
         <p:spPr>
           <a:xfrm>
-            <a:off x="838200" y="1445335"/>
-            <a:ext cx="7509734" cy="5262979"/>
+            <a:off x="838199" y="1445335"/>
+            <a:ext cx="9038573" cy="5262979"/>
           </a:xfrm>
           <a:prstGeom prst="rect">
             <a:avLst/>
@@ -16802,7 +16802,7 @@
                 </a:solidFill>
                 <a:latin typeface="Consolas" panose="020B0609020204030204" pitchFamily="49" charset="0"/>
               </a:rPr>
-              <a:t>    // return the kth digit of v (MSD is digit 0)</a:t>
+              <a:t>    // return the kth digit of v (Least Significant digit is digit 0)</a:t>
             </a:r>
             <a:endParaRPr lang="en-US" sz="1600" dirty="0">
               <a:solidFill>
@@ -37776,6 +37776,49 @@
           </a:graphicData>
         </a:graphic>
       </p:graphicFrame>
+      <p:pic>
+        <p:nvPicPr>
+          <p:cNvPr id="6" name="Picture 5">
+            <a:extLst>
+              <a:ext uri="{FF2B5EF4-FFF2-40B4-BE49-F238E27FC236}">
+                <a16:creationId xmlns:a16="http://schemas.microsoft.com/office/drawing/2014/main" id="{F25A5A1D-1FEC-AC07-9643-6C8FD773B920}"/>
+              </a:ext>
+            </a:extLst>
+          </p:cNvPr>
+          <p:cNvPicPr>
+            <a:picLocks noChangeAspect="1"/>
+          </p:cNvPicPr>
+          <p:nvPr/>
+        </p:nvPicPr>
+        <p:blipFill>
+          <a:blip r:embed="rId2"/>
+          <a:stretch>
+            <a:fillRect/>
+          </a:stretch>
+        </p:blipFill>
+        <p:spPr>
+          <a:xfrm>
+            <a:off x="5291973" y="3132496"/>
+            <a:ext cx="4094842" cy="3169085"/>
+          </a:xfrm>
+          <a:prstGeom prst="rect">
+            <a:avLst/>
+          </a:prstGeom>
+          <a:effectLst>
+            <a:glow rad="520700">
+              <a:schemeClr val="accent1">
+                <a:alpha val="40000"/>
+              </a:schemeClr>
+            </a:glow>
+            <a:outerShdw blurRad="50800" dist="50800" dir="5400000" algn="ctr" rotWithShape="0">
+              <a:srgbClr val="000000">
+                <a:alpha val="66000"/>
+              </a:srgbClr>
+            </a:outerShdw>
+            <a:softEdge rad="0"/>
+          </a:effectLst>
+        </p:spPr>
+      </p:pic>
     </p:spTree>
     <p:extLst>
       <p:ext uri="{BB962C8B-B14F-4D97-AF65-F5344CB8AC3E}">
@@ -39543,6 +39586,36 @@
           </a:p>
         </p:txBody>
       </p:sp>
+      <p:pic>
+        <p:nvPicPr>
+          <p:cNvPr id="6" name="Picture 5">
+            <a:extLst>
+              <a:ext uri="{FF2B5EF4-FFF2-40B4-BE49-F238E27FC236}">
+                <a16:creationId xmlns:a16="http://schemas.microsoft.com/office/drawing/2014/main" id="{A37A4FCD-F2FE-35E2-2266-19C248129429}"/>
+              </a:ext>
+            </a:extLst>
+          </p:cNvPr>
+          <p:cNvPicPr>
+            <a:picLocks noChangeAspect="1"/>
+          </p:cNvPicPr>
+          <p:nvPr/>
+        </p:nvPicPr>
+        <p:blipFill>
+          <a:blip r:embed="rId2"/>
+          <a:stretch>
+            <a:fillRect/>
+          </a:stretch>
+        </p:blipFill>
+        <p:spPr>
+          <a:xfrm>
+            <a:off x="6919404" y="2959195"/>
+            <a:ext cx="4059659" cy="3655377"/>
+          </a:xfrm>
+          <a:prstGeom prst="rect">
+            <a:avLst/>
+          </a:prstGeom>
+        </p:spPr>
+      </p:pic>
     </p:spTree>
     <p:extLst>
       <p:ext uri="{BB962C8B-B14F-4D97-AF65-F5344CB8AC3E}">

</xml_diff>